<commit_message>
[Upgraded] First check in of angular OpenID connect integration.
</commit_message>
<xml_diff>
--- a/Petrol App Design.pptx
+++ b/Petrol App Design.pptx
@@ -12,7 +12,6 @@
     <p:sldId id="260" r:id="rId6"/>
     <p:sldId id="261" r:id="rId7"/>
     <p:sldId id="262" r:id="rId8"/>
-    <p:sldId id="263" r:id="rId9"/>
   </p:sldIdLst>
   <p:sldSz cx="12192000" cy="6858000"/>
   <p:notesSz cx="6858000" cy="9144000"/>
@@ -363,7 +362,7 @@
           <a:p>
             <a:fld id="{9184DA70-C731-4C70-880D-CCD4705E623C}" type="datetime1">
               <a:rPr lang="en-US" smtClean="0"/>
-              <a:t>18.06.2022</a:t>
+              <a:t>25.06.2022</a:t>
             </a:fld>
             <a:endParaRPr lang="en-US" dirty="0"/>
           </a:p>
@@ -551,7 +550,7 @@
           <a:p>
             <a:fld id="{B612A279-0833-481D-8C56-F67FD0AC6C50}" type="datetime1">
               <a:rPr lang="en-US" smtClean="0"/>
-              <a:t>18.06.2022</a:t>
+              <a:t>25.06.2022</a:t>
             </a:fld>
             <a:endParaRPr lang="en-US" dirty="0"/>
           </a:p>
@@ -793,7 +792,7 @@
           <a:p>
             <a:fld id="{6587DA83-5663-4C9C-B9AA-0B40A3DAFF81}" type="datetime1">
               <a:rPr lang="en-US" smtClean="0"/>
-              <a:t>18.06.2022</a:t>
+              <a:t>25.06.2022</a:t>
             </a:fld>
             <a:endParaRPr lang="en-US" dirty="0"/>
           </a:p>
@@ -981,7 +980,7 @@
           <a:p>
             <a:fld id="{4BE1D723-8F53-4F53-90B0-1982A396982E}" type="datetime1">
               <a:rPr lang="en-US" smtClean="0"/>
-              <a:t>18.06.2022</a:t>
+              <a:t>25.06.2022</a:t>
             </a:fld>
             <a:endParaRPr lang="en-US" dirty="0"/>
           </a:p>
@@ -1354,7 +1353,7 @@
           <a:p>
             <a:fld id="{97669AF7-7BEB-44E4-9852-375E34362B5B}" type="datetime1">
               <a:rPr lang="en-US" smtClean="0"/>
-              <a:t>18.06.2022</a:t>
+              <a:t>25.06.2022</a:t>
             </a:fld>
             <a:endParaRPr lang="en-US" dirty="0"/>
           </a:p>
@@ -1609,7 +1608,7 @@
           <a:p>
             <a:fld id="{BAAAC38D-0552-4C82-B593-E6124DFADBE2}" type="datetime1">
               <a:rPr lang="en-US" smtClean="0"/>
-              <a:t>18.06.2022</a:t>
+              <a:t>25.06.2022</a:t>
             </a:fld>
             <a:endParaRPr lang="en-US" dirty="0"/>
           </a:p>
@@ -2006,7 +2005,7 @@
           <a:p>
             <a:fld id="{D9DF0F1C-5577-4ACB-BB62-DF8F3C494C7E}" type="datetime1">
               <a:rPr lang="en-US" smtClean="0"/>
-              <a:t>18.06.2022</a:t>
+              <a:t>25.06.2022</a:t>
             </a:fld>
             <a:endParaRPr lang="en-US" dirty="0"/>
           </a:p>
@@ -2142,7 +2141,7 @@
           <a:p>
             <a:fld id="{1775B394-D9F9-4F0C-B15D-605F45CB9E9F}" type="datetime1">
               <a:rPr lang="en-US" smtClean="0"/>
-              <a:t>18.06.2022</a:t>
+              <a:t>25.06.2022</a:t>
             </a:fld>
             <a:endParaRPr lang="en-US" dirty="0"/>
           </a:p>
@@ -2299,7 +2298,7 @@
           <a:p>
             <a:fld id="{39667345-2558-425A-8533-9BFDBCE15005}" type="datetime1">
               <a:rPr lang="en-US" smtClean="0"/>
-              <a:t>18.06.2022</a:t>
+              <a:t>25.06.2022</a:t>
             </a:fld>
             <a:endParaRPr lang="en-US" dirty="0"/>
           </a:p>
@@ -2628,7 +2627,7 @@
           <a:p>
             <a:fld id="{92BEA474-078D-4E9B-9B14-09A87B19DC46}" type="datetime1">
               <a:rPr lang="en-US" smtClean="0"/>
-              <a:t>18.06.2022</a:t>
+              <a:t>25.06.2022</a:t>
             </a:fld>
             <a:endParaRPr lang="en-US" dirty="0"/>
           </a:p>
@@ -2978,7 +2977,7 @@
           <a:p>
             <a:fld id="{4907D986-8816-4272-A432-0437A28A9828}" type="datetime1">
               <a:rPr lang="en-US" smtClean="0"/>
-              <a:t>18.06.2022</a:t>
+              <a:t>25.06.2022</a:t>
             </a:fld>
             <a:endParaRPr lang="en-US" dirty="0"/>
           </a:p>
@@ -3239,7 +3238,7 @@
           <a:p>
             <a:fld id="{62D6E202-B606-4609-B914-27C9371A1F6D}" type="datetime1">
               <a:rPr lang="en-US" smtClean="0"/>
-              <a:t>18.06.2022</a:t>
+              <a:t>25.06.2022</a:t>
             </a:fld>
             <a:endParaRPr lang="en-US" dirty="0"/>
           </a:p>
@@ -4095,7 +4094,7 @@
         </p:nvSpPr>
         <p:spPr>
           <a:xfrm>
-            <a:off x="8676318" y="5374573"/>
+            <a:off x="5727210" y="5400501"/>
             <a:ext cx="1659131" cy="925896"/>
           </a:xfrm>
           <a:prstGeom prst="rect">
@@ -4160,7 +4159,7 @@
         </p:nvSpPr>
         <p:spPr>
           <a:xfrm>
-            <a:off x="8523918" y="5222173"/>
+            <a:off x="5574810" y="5248101"/>
             <a:ext cx="1659131" cy="925896"/>
           </a:xfrm>
           <a:prstGeom prst="rect">
@@ -4213,10 +4212,86 @@
       </p:sp>
       <p:sp>
         <p:nvSpPr>
-          <p:cNvPr id="110" name="Rectangle 109">
-            <a:extLst>
-              <a:ext uri="{FF2B5EF4-FFF2-40B4-BE49-F238E27FC236}">
-                <a16:creationId xmlns:a16="http://schemas.microsoft.com/office/drawing/2014/main" id="{66E836BD-998E-B4EB-C2B6-B901616343BB}"/>
+          <p:cNvPr id="2" name="Title 1">
+            <a:extLst>
+              <a:ext uri="{FF2B5EF4-FFF2-40B4-BE49-F238E27FC236}">
+                <a16:creationId xmlns:a16="http://schemas.microsoft.com/office/drawing/2014/main" id="{E0548B6B-AB4F-E3D5-94D7-62715CE6FC9E}"/>
+              </a:ext>
+            </a:extLst>
+          </p:cNvPr>
+          <p:cNvSpPr>
+            <a:spLocks noGrp="1"/>
+          </p:cNvSpPr>
+          <p:nvPr>
+            <p:ph type="title"/>
+          </p:nvPr>
+        </p:nvSpPr>
+        <p:spPr>
+          <a:xfrm>
+            <a:off x="1097280" y="286604"/>
+            <a:ext cx="10058400" cy="1006488"/>
+          </a:xfrm>
+        </p:spPr>
+        <p:txBody>
+          <a:bodyPr/>
+          <a:lstStyle/>
+          <a:p>
+            <a:r>
+              <a:rPr lang="en-US" dirty="0"/>
+              <a:t>Architecture</a:t>
+            </a:r>
+          </a:p>
+        </p:txBody>
+      </p:sp>
+      <p:cxnSp>
+        <p:nvCxnSpPr>
+          <p:cNvPr id="6" name="Straight Connector 5">
+            <a:extLst>
+              <a:ext uri="{FF2B5EF4-FFF2-40B4-BE49-F238E27FC236}">
+                <a16:creationId xmlns:a16="http://schemas.microsoft.com/office/drawing/2014/main" id="{D9D4C8E0-4A01-BCB5-ED87-21CDC7AA6A5E}"/>
+              </a:ext>
+            </a:extLst>
+          </p:cNvPr>
+          <p:cNvCxnSpPr>
+            <a:cxnSpLocks/>
+          </p:cNvCxnSpPr>
+          <p:nvPr/>
+        </p:nvCxnSpPr>
+        <p:spPr>
+          <a:xfrm>
+            <a:off x="2697873" y="2001390"/>
+            <a:ext cx="0" cy="4202545"/>
+          </a:xfrm>
+          <a:prstGeom prst="line">
+            <a:avLst/>
+          </a:prstGeom>
+          <a:ln w="12700">
+            <a:solidFill>
+              <a:schemeClr val="tx2"/>
+            </a:solidFill>
+          </a:ln>
+        </p:spPr>
+        <p:style>
+          <a:lnRef idx="1">
+            <a:schemeClr val="accent1"/>
+          </a:lnRef>
+          <a:fillRef idx="0">
+            <a:schemeClr val="accent1"/>
+          </a:fillRef>
+          <a:effectRef idx="0">
+            <a:schemeClr val="accent1"/>
+          </a:effectRef>
+          <a:fontRef idx="minor">
+            <a:schemeClr val="tx1"/>
+          </a:fontRef>
+        </p:style>
+      </p:cxnSp>
+      <p:sp>
+        <p:nvSpPr>
+          <p:cNvPr id="12" name="Rectangle 11">
+            <a:extLst>
+              <a:ext uri="{FF2B5EF4-FFF2-40B4-BE49-F238E27FC236}">
+                <a16:creationId xmlns:a16="http://schemas.microsoft.com/office/drawing/2014/main" id="{EA3F9AD1-7D69-4884-8519-6E56D3395613}"/>
               </a:ext>
             </a:extLst>
           </p:cNvPr>
@@ -4225,17 +4300,14 @@
         </p:nvSpPr>
         <p:spPr>
           <a:xfrm>
-            <a:off x="5659192" y="5387109"/>
-            <a:ext cx="1659132" cy="925896"/>
+            <a:off x="2946087" y="3130068"/>
+            <a:ext cx="1115890" cy="1192033"/>
           </a:xfrm>
           <a:prstGeom prst="rect">
             <a:avLst/>
           </a:prstGeom>
           <a:solidFill>
-            <a:schemeClr val="accent4">
-              <a:lumMod val="60000"/>
-              <a:lumOff val="40000"/>
-            </a:schemeClr>
+            <a:srgbClr val="D2842E"/>
           </a:solidFill>
         </p:spPr>
         <p:style>
@@ -4274,17 +4346,17 @@
             <a:pPr algn="ctr"/>
             <a:r>
               <a:rPr lang="en-US" sz="1800" kern="1200" dirty="0"/>
-              <a:t>Petrol User Resource</a:t>
-            </a:r>
-          </a:p>
-        </p:txBody>
-      </p:sp>
-      <p:sp>
-        <p:nvSpPr>
-          <p:cNvPr id="109" name="Rectangle 108">
-            <a:extLst>
-              <a:ext uri="{FF2B5EF4-FFF2-40B4-BE49-F238E27FC236}">
-                <a16:creationId xmlns:a16="http://schemas.microsoft.com/office/drawing/2014/main" id="{FDF2D4FC-517C-F7B4-0EAF-B7EF7E605C74}"/>
+              <a:t>Petrol Cloud Gateway</a:t>
+            </a:r>
+          </a:p>
+        </p:txBody>
+      </p:sp>
+      <p:sp>
+        <p:nvSpPr>
+          <p:cNvPr id="15" name="Rectangle 14">
+            <a:extLst>
+              <a:ext uri="{FF2B5EF4-FFF2-40B4-BE49-F238E27FC236}">
+                <a16:creationId xmlns:a16="http://schemas.microsoft.com/office/drawing/2014/main" id="{09FC4189-03DA-F35D-85FA-A9BC338E8CF1}"/>
               </a:ext>
             </a:extLst>
           </p:cNvPr>
@@ -4293,18 +4365,12 @@
         </p:nvSpPr>
         <p:spPr>
           <a:xfrm>
-            <a:off x="5506792" y="5234709"/>
-            <a:ext cx="1659132" cy="925896"/>
+            <a:off x="857917" y="2858373"/>
+            <a:ext cx="1343034" cy="1848710"/>
           </a:xfrm>
           <a:prstGeom prst="rect">
             <a:avLst/>
           </a:prstGeom>
-          <a:solidFill>
-            <a:schemeClr val="accent4">
-              <a:lumMod val="60000"/>
-              <a:lumOff val="40000"/>
-            </a:schemeClr>
-          </a:solidFill>
         </p:spPr>
         <p:style>
           <a:lnRef idx="2">
@@ -4341,94 +4407,18 @@
           <a:p>
             <a:pPr algn="ctr"/>
             <a:r>
-              <a:rPr lang="en-US" sz="1800" kern="1200" dirty="0"/>
-              <a:t>Petrol User Resource</a:t>
-            </a:r>
-          </a:p>
-        </p:txBody>
-      </p:sp>
-      <p:sp>
-        <p:nvSpPr>
-          <p:cNvPr id="2" name="Title 1">
-            <a:extLst>
-              <a:ext uri="{FF2B5EF4-FFF2-40B4-BE49-F238E27FC236}">
-                <a16:creationId xmlns:a16="http://schemas.microsoft.com/office/drawing/2014/main" id="{E0548B6B-AB4F-E3D5-94D7-62715CE6FC9E}"/>
-              </a:ext>
-            </a:extLst>
-          </p:cNvPr>
-          <p:cNvSpPr>
-            <a:spLocks noGrp="1"/>
-          </p:cNvSpPr>
-          <p:nvPr>
-            <p:ph type="title"/>
-          </p:nvPr>
-        </p:nvSpPr>
-        <p:spPr>
-          <a:xfrm>
-            <a:off x="1097280" y="286604"/>
-            <a:ext cx="10058400" cy="1006488"/>
-          </a:xfrm>
-        </p:spPr>
-        <p:txBody>
-          <a:bodyPr/>
-          <a:lstStyle/>
-          <a:p>
-            <a:r>
               <a:rPr lang="en-US" dirty="0"/>
-              <a:t>Architecture</a:t>
-            </a:r>
-          </a:p>
-        </p:txBody>
-      </p:sp>
-      <p:cxnSp>
-        <p:nvCxnSpPr>
-          <p:cNvPr id="6" name="Straight Connector 5">
-            <a:extLst>
-              <a:ext uri="{FF2B5EF4-FFF2-40B4-BE49-F238E27FC236}">
-                <a16:creationId xmlns:a16="http://schemas.microsoft.com/office/drawing/2014/main" id="{D9D4C8E0-4A01-BCB5-ED87-21CDC7AA6A5E}"/>
-              </a:ext>
-            </a:extLst>
-          </p:cNvPr>
-          <p:cNvCxnSpPr>
-            <a:cxnSpLocks/>
-          </p:cNvCxnSpPr>
-          <p:nvPr/>
-        </p:nvCxnSpPr>
-        <p:spPr>
-          <a:xfrm>
-            <a:off x="2697873" y="2001390"/>
-            <a:ext cx="0" cy="4202545"/>
-          </a:xfrm>
-          <a:prstGeom prst="line">
-            <a:avLst/>
-          </a:prstGeom>
-          <a:ln w="12700">
-            <a:solidFill>
-              <a:schemeClr val="tx2"/>
-            </a:solidFill>
-          </a:ln>
-        </p:spPr>
-        <p:style>
-          <a:lnRef idx="1">
-            <a:schemeClr val="accent1"/>
-          </a:lnRef>
-          <a:fillRef idx="0">
-            <a:schemeClr val="accent1"/>
-          </a:fillRef>
-          <a:effectRef idx="0">
-            <a:schemeClr val="accent1"/>
-          </a:effectRef>
-          <a:fontRef idx="minor">
-            <a:schemeClr val="tx1"/>
-          </a:fontRef>
-        </p:style>
-      </p:cxnSp>
-      <p:sp>
-        <p:nvSpPr>
-          <p:cNvPr id="12" name="Rectangle 11">
-            <a:extLst>
-              <a:ext uri="{FF2B5EF4-FFF2-40B4-BE49-F238E27FC236}">
-                <a16:creationId xmlns:a16="http://schemas.microsoft.com/office/drawing/2014/main" id="{EA3F9AD1-7D69-4884-8519-6E56D3395613}"/>
+              <a:t>Petrol Web App SPA</a:t>
+            </a:r>
+          </a:p>
+        </p:txBody>
+      </p:sp>
+      <p:sp>
+        <p:nvSpPr>
+          <p:cNvPr id="20" name="Rectangle 19">
+            <a:extLst>
+              <a:ext uri="{FF2B5EF4-FFF2-40B4-BE49-F238E27FC236}">
+                <a16:creationId xmlns:a16="http://schemas.microsoft.com/office/drawing/2014/main" id="{971C7079-8A9F-878B-D5D8-27135868EB0D}"/>
               </a:ext>
             </a:extLst>
           </p:cNvPr>
@@ -4437,14 +4427,16 @@
         </p:nvSpPr>
         <p:spPr>
           <a:xfrm>
-            <a:off x="2946087" y="3130068"/>
-            <a:ext cx="1115890" cy="1192033"/>
+            <a:off x="8164449" y="2149354"/>
+            <a:ext cx="1115890" cy="914516"/>
           </a:xfrm>
           <a:prstGeom prst="rect">
             <a:avLst/>
           </a:prstGeom>
           <a:solidFill>
-            <a:srgbClr val="D2842E"/>
+            <a:schemeClr val="accent1">
+              <a:lumMod val="75000"/>
+            </a:schemeClr>
           </a:solidFill>
         </p:spPr>
         <p:style>
@@ -4483,17 +4475,17 @@
             <a:pPr algn="ctr"/>
             <a:r>
               <a:rPr lang="en-US" sz="1800" kern="1200" dirty="0"/>
-              <a:t>Petrol Cloud Gateway</a:t>
-            </a:r>
-          </a:p>
-        </p:txBody>
-      </p:sp>
-      <p:sp>
-        <p:nvSpPr>
-          <p:cNvPr id="15" name="Rectangle 14">
-            <a:extLst>
-              <a:ext uri="{FF2B5EF4-FFF2-40B4-BE49-F238E27FC236}">
-                <a16:creationId xmlns:a16="http://schemas.microsoft.com/office/drawing/2014/main" id="{09FC4189-03DA-F35D-85FA-A9BC338E8CF1}"/>
+              <a:t>Petrol Cloud Discovery</a:t>
+            </a:r>
+          </a:p>
+        </p:txBody>
+      </p:sp>
+      <p:sp>
+        <p:nvSpPr>
+          <p:cNvPr id="22" name="Rectangle 21">
+            <a:extLst>
+              <a:ext uri="{FF2B5EF4-FFF2-40B4-BE49-F238E27FC236}">
+                <a16:creationId xmlns:a16="http://schemas.microsoft.com/office/drawing/2014/main" id="{5FF444A4-C916-BF23-A238-A9E874ADF8B0}"/>
               </a:ext>
             </a:extLst>
           </p:cNvPr>
@@ -4502,12 +4494,15 @@
         </p:nvSpPr>
         <p:spPr>
           <a:xfrm>
-            <a:off x="857917" y="2858373"/>
-            <a:ext cx="1343034" cy="1848710"/>
+            <a:off x="5422410" y="5095701"/>
+            <a:ext cx="1659131" cy="925896"/>
           </a:xfrm>
           <a:prstGeom prst="rect">
             <a:avLst/>
           </a:prstGeom>
+          <a:solidFill>
+            <a:srgbClr val="B1D309"/>
+          </a:solidFill>
         </p:spPr>
         <p:style>
           <a:lnRef idx="2">
@@ -4544,18 +4539,18 @@
           <a:p>
             <a:pPr algn="ctr"/>
             <a:r>
-              <a:rPr lang="en-US" dirty="0"/>
-              <a:t>Petrol Web App SPA</a:t>
-            </a:r>
-          </a:p>
-        </p:txBody>
-      </p:sp>
-      <p:sp>
-        <p:nvSpPr>
-          <p:cNvPr id="20" name="Rectangle 19">
-            <a:extLst>
-              <a:ext uri="{FF2B5EF4-FFF2-40B4-BE49-F238E27FC236}">
-                <a16:creationId xmlns:a16="http://schemas.microsoft.com/office/drawing/2014/main" id="{971C7079-8A9F-878B-D5D8-27135868EB0D}"/>
+              <a:rPr lang="en-US" sz="1800" kern="1200" dirty="0"/>
+              <a:t>Petrol Business Resource</a:t>
+            </a:r>
+          </a:p>
+        </p:txBody>
+      </p:sp>
+      <p:sp>
+        <p:nvSpPr>
+          <p:cNvPr id="23" name="Rectangle 22">
+            <a:extLst>
+              <a:ext uri="{FF2B5EF4-FFF2-40B4-BE49-F238E27FC236}">
+                <a16:creationId xmlns:a16="http://schemas.microsoft.com/office/drawing/2014/main" id="{781D1260-46B9-BDDD-10BD-E8BBAB7A6BBB}"/>
               </a:ext>
             </a:extLst>
           </p:cNvPr>
@@ -4564,16 +4559,14 @@
         </p:nvSpPr>
         <p:spPr>
           <a:xfrm>
-            <a:off x="8164449" y="2149354"/>
-            <a:ext cx="1115890" cy="914516"/>
+            <a:off x="5355636" y="2149353"/>
+            <a:ext cx="2475122" cy="925896"/>
           </a:xfrm>
           <a:prstGeom prst="rect">
             <a:avLst/>
           </a:prstGeom>
           <a:solidFill>
-            <a:schemeClr val="accent1">
-              <a:lumMod val="75000"/>
-            </a:schemeClr>
+            <a:srgbClr val="FF0000"/>
           </a:solidFill>
         </p:spPr>
         <p:style>
@@ -4612,205 +4605,7 @@
             <a:pPr algn="ctr"/>
             <a:r>
               <a:rPr lang="en-US" sz="1800" kern="1200" dirty="0"/>
-              <a:t>Petrol Cloud Discovery</a:t>
-            </a:r>
-          </a:p>
-        </p:txBody>
-      </p:sp>
-      <p:sp>
-        <p:nvSpPr>
-          <p:cNvPr id="21" name="Rectangle 20">
-            <a:extLst>
-              <a:ext uri="{FF2B5EF4-FFF2-40B4-BE49-F238E27FC236}">
-                <a16:creationId xmlns:a16="http://schemas.microsoft.com/office/drawing/2014/main" id="{844322C7-554F-6538-B4F6-D3A1F551750C}"/>
-              </a:ext>
-            </a:extLst>
-          </p:cNvPr>
-          <p:cNvSpPr/>
-          <p:nvPr/>
-        </p:nvSpPr>
-        <p:spPr>
-          <a:xfrm>
-            <a:off x="5354392" y="5082309"/>
-            <a:ext cx="1659132" cy="925896"/>
-          </a:xfrm>
-          <a:prstGeom prst="rect">
-            <a:avLst/>
-          </a:prstGeom>
-          <a:solidFill>
-            <a:schemeClr val="accent4">
-              <a:lumMod val="60000"/>
-              <a:lumOff val="40000"/>
-            </a:schemeClr>
-          </a:solidFill>
-        </p:spPr>
-        <p:style>
-          <a:lnRef idx="2">
-            <a:schemeClr val="lt1">
-              <a:hueOff val="0"/>
-              <a:satOff val="0"/>
-              <a:lumOff val="0"/>
-              <a:alphaOff val="0"/>
-            </a:schemeClr>
-          </a:lnRef>
-          <a:fillRef idx="1">
-            <a:schemeClr val="accent1">
-              <a:hueOff val="0"/>
-              <a:satOff val="0"/>
-              <a:lumOff val="0"/>
-              <a:alphaOff val="0"/>
-            </a:schemeClr>
-          </a:fillRef>
-          <a:effectRef idx="0">
-            <a:schemeClr val="accent1">
-              <a:hueOff val="0"/>
-              <a:satOff val="0"/>
-              <a:lumOff val="0"/>
-              <a:alphaOff val="0"/>
-            </a:schemeClr>
-          </a:effectRef>
-          <a:fontRef idx="minor">
-            <a:schemeClr val="lt1"/>
-          </a:fontRef>
-        </p:style>
-        <p:txBody>
-          <a:bodyPr anchor="ctr"/>
-          <a:lstStyle/>
-          <a:p>
-            <a:pPr algn="ctr"/>
-            <a:r>
-              <a:rPr lang="en-US" sz="1800" kern="1200" dirty="0"/>
-              <a:t>Petrol User Resource</a:t>
-            </a:r>
-          </a:p>
-        </p:txBody>
-      </p:sp>
-      <p:sp>
-        <p:nvSpPr>
-          <p:cNvPr id="22" name="Rectangle 21">
-            <a:extLst>
-              <a:ext uri="{FF2B5EF4-FFF2-40B4-BE49-F238E27FC236}">
-                <a16:creationId xmlns:a16="http://schemas.microsoft.com/office/drawing/2014/main" id="{5FF444A4-C916-BF23-A238-A9E874ADF8B0}"/>
-              </a:ext>
-            </a:extLst>
-          </p:cNvPr>
-          <p:cNvSpPr/>
-          <p:nvPr/>
-        </p:nvSpPr>
-        <p:spPr>
-          <a:xfrm>
-            <a:off x="8371518" y="5069773"/>
-            <a:ext cx="1659131" cy="925896"/>
-          </a:xfrm>
-          <a:prstGeom prst="rect">
-            <a:avLst/>
-          </a:prstGeom>
-          <a:solidFill>
-            <a:srgbClr val="B1D309"/>
-          </a:solidFill>
-        </p:spPr>
-        <p:style>
-          <a:lnRef idx="2">
-            <a:schemeClr val="lt1">
-              <a:hueOff val="0"/>
-              <a:satOff val="0"/>
-              <a:lumOff val="0"/>
-              <a:alphaOff val="0"/>
-            </a:schemeClr>
-          </a:lnRef>
-          <a:fillRef idx="1">
-            <a:schemeClr val="accent1">
-              <a:hueOff val="0"/>
-              <a:satOff val="0"/>
-              <a:lumOff val="0"/>
-              <a:alphaOff val="0"/>
-            </a:schemeClr>
-          </a:fillRef>
-          <a:effectRef idx="0">
-            <a:schemeClr val="accent1">
-              <a:hueOff val="0"/>
-              <a:satOff val="0"/>
-              <a:lumOff val="0"/>
-              <a:alphaOff val="0"/>
-            </a:schemeClr>
-          </a:effectRef>
-          <a:fontRef idx="minor">
-            <a:schemeClr val="lt1"/>
-          </a:fontRef>
-        </p:style>
-        <p:txBody>
-          <a:bodyPr anchor="ctr"/>
-          <a:lstStyle/>
-          <a:p>
-            <a:pPr algn="ctr"/>
-            <a:r>
-              <a:rPr lang="en-US" sz="1800" kern="1200" dirty="0"/>
-              <a:t>Petrol Business Resource</a:t>
-            </a:r>
-          </a:p>
-        </p:txBody>
-      </p:sp>
-      <p:sp>
-        <p:nvSpPr>
-          <p:cNvPr id="23" name="Rectangle 22">
-            <a:extLst>
-              <a:ext uri="{FF2B5EF4-FFF2-40B4-BE49-F238E27FC236}">
-                <a16:creationId xmlns:a16="http://schemas.microsoft.com/office/drawing/2014/main" id="{781D1260-46B9-BDDD-10BD-E8BBAB7A6BBB}"/>
-              </a:ext>
-            </a:extLst>
-          </p:cNvPr>
-          <p:cNvSpPr/>
-          <p:nvPr/>
-        </p:nvSpPr>
-        <p:spPr>
-          <a:xfrm>
-            <a:off x="5355636" y="2149353"/>
-            <a:ext cx="1659132" cy="925896"/>
-          </a:xfrm>
-          <a:prstGeom prst="rect">
-            <a:avLst/>
-          </a:prstGeom>
-          <a:solidFill>
-            <a:srgbClr val="FF0000"/>
-          </a:solidFill>
-        </p:spPr>
-        <p:style>
-          <a:lnRef idx="2">
-            <a:schemeClr val="lt1">
-              <a:hueOff val="0"/>
-              <a:satOff val="0"/>
-              <a:lumOff val="0"/>
-              <a:alphaOff val="0"/>
-            </a:schemeClr>
-          </a:lnRef>
-          <a:fillRef idx="1">
-            <a:schemeClr val="accent1">
-              <a:hueOff val="0"/>
-              <a:satOff val="0"/>
-              <a:lumOff val="0"/>
-              <a:alphaOff val="0"/>
-            </a:schemeClr>
-          </a:fillRef>
-          <a:effectRef idx="0">
-            <a:schemeClr val="accent1">
-              <a:hueOff val="0"/>
-              <a:satOff val="0"/>
-              <a:lumOff val="0"/>
-              <a:alphaOff val="0"/>
-            </a:schemeClr>
-          </a:effectRef>
-          <a:fontRef idx="minor">
-            <a:schemeClr val="lt1"/>
-          </a:fontRef>
-        </p:style>
-        <p:txBody>
-          <a:bodyPr anchor="ctr"/>
-          <a:lstStyle/>
-          <a:p>
-            <a:pPr algn="ctr"/>
-            <a:r>
-              <a:rPr lang="en-US" sz="1800" kern="1200" dirty="0"/>
-              <a:t>Petrol Authorization Server</a:t>
+              <a:t>Petrol Authorization And User Resource Server</a:t>
             </a:r>
           </a:p>
         </p:txBody>
@@ -5516,59 +5311,13 @@
           </p:cNvPr>
           <p:cNvCxnSpPr>
             <a:cxnSpLocks/>
-            <a:endCxn id="20" idx="1"/>
           </p:cNvCxnSpPr>
           <p:nvPr/>
         </p:nvCxnSpPr>
         <p:spPr>
           <a:xfrm rot="5400000" flipH="1" flipV="1">
-            <a:off x="6346406" y="3453319"/>
-            <a:ext cx="2664750" cy="971336"/>
-          </a:xfrm>
-          <a:prstGeom prst="curvedConnector2">
-            <a:avLst/>
-          </a:prstGeom>
-          <a:ln>
-            <a:solidFill>
-              <a:srgbClr val="FF0000"/>
-            </a:solidFill>
-            <a:tailEnd type="triangle"/>
-          </a:ln>
-        </p:spPr>
-        <p:style>
-          <a:lnRef idx="1">
-            <a:schemeClr val="accent1"/>
-          </a:lnRef>
-          <a:fillRef idx="0">
-            <a:schemeClr val="accent1"/>
-          </a:fillRef>
-          <a:effectRef idx="0">
-            <a:schemeClr val="accent1"/>
-          </a:effectRef>
-          <a:fontRef idx="minor">
-            <a:schemeClr val="tx1"/>
-          </a:fontRef>
-        </p:style>
-      </p:cxnSp>
-      <p:cxnSp>
-        <p:nvCxnSpPr>
-          <p:cNvPr id="118" name="Connector: Elbow 115">
-            <a:extLst>
-              <a:ext uri="{FF2B5EF4-FFF2-40B4-BE49-F238E27FC236}">
-                <a16:creationId xmlns:a16="http://schemas.microsoft.com/office/drawing/2014/main" id="{4DEAF282-27D6-1ED6-4EB8-24D3B5EC3ACC}"/>
-              </a:ext>
-            </a:extLst>
-          </p:cNvPr>
-          <p:cNvCxnSpPr>
-            <a:cxnSpLocks/>
-            <a:endCxn id="20" idx="2"/>
-          </p:cNvCxnSpPr>
-          <p:nvPr/>
-        </p:nvCxnSpPr>
-        <p:spPr>
-          <a:xfrm rot="16200000" flipV="1">
-            <a:off x="8343282" y="3442982"/>
-            <a:ext cx="1962732" cy="1204508"/>
+            <a:off x="6966134" y="3290849"/>
+            <a:ext cx="2207493" cy="1753535"/>
           </a:xfrm>
           <a:prstGeom prst="curvedConnector3">
             <a:avLst>
@@ -5611,7 +5360,7 @@
         </p:nvSpPr>
         <p:spPr>
           <a:xfrm>
-            <a:off x="9078386" y="3752773"/>
+            <a:off x="8364274" y="3901009"/>
             <a:ext cx="1093340" cy="646331"/>
           </a:xfrm>
           <a:prstGeom prst="rect">
@@ -6315,7 +6064,7 @@
             </a:pPr>
             <a:r>
               <a:rPr lang="en-US" dirty="0"/>
-              <a:t>Spring Boot Authorization</a:t>
+              <a:t>Spring Boot Authorization Server</a:t>
             </a:r>
           </a:p>
           <a:p>
@@ -6328,15 +6077,20 @@
             </a:pPr>
             <a:r>
               <a:rPr lang="en-US" dirty="0"/>
-              <a:t>OAuth2 based </a:t>
-            </a:r>
-            <a:r>
-              <a:rPr lang="en-US" dirty="0" err="1"/>
-              <a:t>Authencation</a:t>
-            </a:r>
+              <a:t>This is as user resource – maintains users and roles</a:t>
+            </a:r>
+          </a:p>
+          <a:p>
+            <a:pPr>
+              <a:lnSpc>
+                <a:spcPct val="100000"/>
+              </a:lnSpc>
+              <a:buFont typeface="Arial" panose="020B0604020202020204" pitchFamily="34" charset="0"/>
+              <a:buChar char="•"/>
+            </a:pPr>
             <a:r>
               <a:rPr lang="en-US" dirty="0"/>
-              <a:t> and Authorization</a:t>
+              <a:t>OAuth2 based Authentication and Authorization</a:t>
             </a:r>
           </a:p>
           <a:p>
@@ -6669,222 +6423,6 @@
     <p:extLst>
       <p:ext uri="{BB962C8B-B14F-4D97-AF65-F5344CB8AC3E}">
         <p14:creationId xmlns:p14="http://schemas.microsoft.com/office/powerpoint/2010/main" val="4037110314"/>
-      </p:ext>
-    </p:extLst>
-  </p:cSld>
-  <p:clrMapOvr>
-    <a:masterClrMapping/>
-  </p:clrMapOvr>
-</p:sld>
-</file>
-
-<file path=ppt/slides/slide8.xml><?xml version="1.0" encoding="utf-8"?>
-<p:sld xmlns:a="http://schemas.openxmlformats.org/drawingml/2006/main" xmlns:r="http://schemas.openxmlformats.org/officeDocument/2006/relationships" xmlns:p="http://schemas.openxmlformats.org/presentationml/2006/main">
-  <p:cSld>
-    <p:spTree>
-      <p:nvGrpSpPr>
-        <p:cNvPr id="1" name=""/>
-        <p:cNvGrpSpPr/>
-        <p:nvPr/>
-      </p:nvGrpSpPr>
-      <p:grpSpPr>
-        <a:xfrm>
-          <a:off x="0" y="0"/>
-          <a:ext cx="0" cy="0"/>
-          <a:chOff x="0" y="0"/>
-          <a:chExt cx="0" cy="0"/>
-        </a:xfrm>
-      </p:grpSpPr>
-      <p:sp>
-        <p:nvSpPr>
-          <p:cNvPr id="3" name="Content Placeholder 2">
-            <a:extLst>
-              <a:ext uri="{FF2B5EF4-FFF2-40B4-BE49-F238E27FC236}">
-                <a16:creationId xmlns:a16="http://schemas.microsoft.com/office/drawing/2014/main" id="{4398B75A-EF55-6564-B361-152823CD5D16}"/>
-              </a:ext>
-            </a:extLst>
-          </p:cNvPr>
-          <p:cNvSpPr>
-            <a:spLocks noGrp="1"/>
-          </p:cNvSpPr>
-          <p:nvPr>
-            <p:ph idx="1"/>
-          </p:nvPr>
-        </p:nvSpPr>
-        <p:spPr>
-          <a:xfrm>
-            <a:off x="3657600" y="2108201"/>
-            <a:ext cx="7848600" cy="3760891"/>
-          </a:xfrm>
-        </p:spPr>
-        <p:txBody>
-          <a:bodyPr numCol="1"/>
-          <a:lstStyle/>
-          <a:p>
-            <a:pPr>
-              <a:lnSpc>
-                <a:spcPct val="100000"/>
-              </a:lnSpc>
-              <a:buFont typeface="Arial" panose="020B0604020202020204" pitchFamily="34" charset="0"/>
-              <a:buChar char="•"/>
-            </a:pPr>
-            <a:r>
-              <a:rPr lang="en-US" dirty="0"/>
-              <a:t>Spring Boot </a:t>
-            </a:r>
-            <a:r>
-              <a:rPr lang="en-US" dirty="0" err="1"/>
-              <a:t>WebFlux</a:t>
-            </a:r>
-            <a:r>
-              <a:rPr lang="en-US" dirty="0"/>
-              <a:t> User Resource Server</a:t>
-            </a:r>
-          </a:p>
-          <a:p>
-            <a:pPr>
-              <a:lnSpc>
-                <a:spcPct val="100000"/>
-              </a:lnSpc>
-              <a:buFont typeface="Arial" panose="020B0604020202020204" pitchFamily="34" charset="0"/>
-              <a:buChar char="•"/>
-            </a:pPr>
-            <a:r>
-              <a:rPr lang="en-US" dirty="0"/>
-              <a:t>OAuth2 based </a:t>
-            </a:r>
-            <a:r>
-              <a:rPr lang="en-US" dirty="0" err="1"/>
-              <a:t>Authencation</a:t>
-            </a:r>
-            <a:r>
-              <a:rPr lang="en-US" dirty="0"/>
-              <a:t> and Authorization</a:t>
-            </a:r>
-          </a:p>
-          <a:p>
-            <a:pPr>
-              <a:lnSpc>
-                <a:spcPct val="100000"/>
-              </a:lnSpc>
-              <a:buFont typeface="Arial" panose="020B0604020202020204" pitchFamily="34" charset="0"/>
-              <a:buChar char="•"/>
-            </a:pPr>
-            <a:r>
-              <a:rPr lang="en-US" dirty="0"/>
-              <a:t>JPA Based Repository</a:t>
-            </a:r>
-          </a:p>
-          <a:p>
-            <a:endParaRPr lang="en-US" dirty="0"/>
-          </a:p>
-        </p:txBody>
-      </p:sp>
-      <p:sp>
-        <p:nvSpPr>
-          <p:cNvPr id="7" name="Title 1">
-            <a:extLst>
-              <a:ext uri="{FF2B5EF4-FFF2-40B4-BE49-F238E27FC236}">
-                <a16:creationId xmlns:a16="http://schemas.microsoft.com/office/drawing/2014/main" id="{5C4E700E-CCA8-D62D-FA91-F8C80E4113A9}"/>
-              </a:ext>
-            </a:extLst>
-          </p:cNvPr>
-          <p:cNvSpPr>
-            <a:spLocks noGrp="1"/>
-          </p:cNvSpPr>
-          <p:nvPr>
-            <p:ph type="title"/>
-          </p:nvPr>
-        </p:nvSpPr>
-        <p:spPr>
-          <a:xfrm>
-            <a:off x="1097280" y="286604"/>
-            <a:ext cx="10058400" cy="1006488"/>
-          </a:xfrm>
-        </p:spPr>
-        <p:txBody>
-          <a:bodyPr/>
-          <a:lstStyle/>
-          <a:p>
-            <a:r>
-              <a:rPr lang="en-US" dirty="0"/>
-              <a:t>Petrol User Resource Server</a:t>
-            </a:r>
-          </a:p>
-        </p:txBody>
-      </p:sp>
-      <p:sp>
-        <p:nvSpPr>
-          <p:cNvPr id="6" name="Rectangle 5">
-            <a:extLst>
-              <a:ext uri="{FF2B5EF4-FFF2-40B4-BE49-F238E27FC236}">
-                <a16:creationId xmlns:a16="http://schemas.microsoft.com/office/drawing/2014/main" id="{00F6E005-804C-5AB0-854F-E4A0FD0E27A9}"/>
-              </a:ext>
-            </a:extLst>
-          </p:cNvPr>
-          <p:cNvSpPr/>
-          <p:nvPr/>
-        </p:nvSpPr>
-        <p:spPr>
-          <a:xfrm>
-            <a:off x="1219200" y="2819400"/>
-            <a:ext cx="1659132" cy="925896"/>
-          </a:xfrm>
-          <a:prstGeom prst="rect">
-            <a:avLst/>
-          </a:prstGeom>
-          <a:solidFill>
-            <a:schemeClr val="accent4">
-              <a:lumMod val="60000"/>
-              <a:lumOff val="40000"/>
-            </a:schemeClr>
-          </a:solidFill>
-        </p:spPr>
-        <p:style>
-          <a:lnRef idx="2">
-            <a:schemeClr val="lt1">
-              <a:hueOff val="0"/>
-              <a:satOff val="0"/>
-              <a:lumOff val="0"/>
-              <a:alphaOff val="0"/>
-            </a:schemeClr>
-          </a:lnRef>
-          <a:fillRef idx="1">
-            <a:schemeClr val="accent1">
-              <a:hueOff val="0"/>
-              <a:satOff val="0"/>
-              <a:lumOff val="0"/>
-              <a:alphaOff val="0"/>
-            </a:schemeClr>
-          </a:fillRef>
-          <a:effectRef idx="0">
-            <a:schemeClr val="accent1">
-              <a:hueOff val="0"/>
-              <a:satOff val="0"/>
-              <a:lumOff val="0"/>
-              <a:alphaOff val="0"/>
-            </a:schemeClr>
-          </a:effectRef>
-          <a:fontRef idx="minor">
-            <a:schemeClr val="lt1"/>
-          </a:fontRef>
-        </p:style>
-        <p:txBody>
-          <a:bodyPr anchor="ctr"/>
-          <a:lstStyle/>
-          <a:p>
-            <a:pPr algn="ctr"/>
-            <a:r>
-              <a:rPr lang="en-US" sz="1800" kern="1200" dirty="0"/>
-              <a:t>Petrol User Resource</a:t>
-            </a:r>
-          </a:p>
-        </p:txBody>
-      </p:sp>
-    </p:spTree>
-    <p:extLst>
-      <p:ext uri="{BB962C8B-B14F-4D97-AF65-F5344CB8AC3E}">
-        <p14:creationId xmlns:p14="http://schemas.microsoft.com/office/powerpoint/2010/main" val="72866062"/>
       </p:ext>
     </p:extLst>
   </p:cSld>

</xml_diff>